<commit_message>
Minor changes on W3, W5 and W11S1.
</commit_message>
<xml_diff>
--- a/W3/3. W3S3 final/W3S3.pptx
+++ b/W3/3. W3S3 final/W3S3.pptx
@@ -280,14 +280,6 @@
 </p:presentation>
 </file>
 
-<file path=ppt/revisionInfo.xml><?xml version="1.0" encoding="utf-8"?>
-<p1510:revInfo xmlns:a="http://schemas.openxmlformats.org/drawingml/2006/main" xmlns:r="http://schemas.openxmlformats.org/officeDocument/2006/relationships" xmlns:p1510="http://schemas.microsoft.com/office/powerpoint/2015/10/main">
-  <p1510:revLst>
-    <p1510:client id="{AC0CA790-EDC2-4116-8838-0C3C4AEF80E1}" v="392" dt="2023-07-06T04:12:48.427"/>
-  </p1510:revLst>
-</p1510:revInfo>
-</file>
-
 <file path=ppt/changesInfos/changesInfo1.xml><?xml version="1.0" encoding="utf-8"?>
 <pc:chgInfo xmlns:a="http://schemas.openxmlformats.org/drawingml/2006/main" xmlns:r="http://schemas.openxmlformats.org/officeDocument/2006/relationships" xmlns:ac="http://schemas.microsoft.com/office/drawing/2013/main/command" xmlns:pc="http://schemas.microsoft.com/office/powerpoint/2013/main/command">
   <pc:docChgLst>
@@ -5697,6 +5689,45 @@
             <pc:docMk/>
             <pc:sldMk cId="3100375267" sldId="826"/>
             <ac:spMk id="6" creationId="{809CF8BE-879B-5BE7-5756-1FE0DC7D50D5}"/>
+          </ac:spMkLst>
+        </pc:spChg>
+      </pc:sldChg>
+    </pc:docChg>
+  </pc:docChgLst>
+  <pc:docChgLst>
+    <pc:chgData name="Matthieu De Mari" userId="dfb708c9-d8dc-439f-9a3b-c772bf4a311c" providerId="ADAL" clId="{C2A075CF-C4D9-45BF-A2F4-9F4744A685AF}"/>
+    <pc:docChg chg="modSld">
+      <pc:chgData name="Matthieu De Mari" userId="dfb708c9-d8dc-439f-9a3b-c772bf4a311c" providerId="ADAL" clId="{C2A075CF-C4D9-45BF-A2F4-9F4744A685AF}" dt="2023-09-06T11:10:09.300" v="19" actId="20577"/>
+      <pc:docMkLst>
+        <pc:docMk/>
+      </pc:docMkLst>
+      <pc:sldChg chg="modSp mod">
+        <pc:chgData name="Matthieu De Mari" userId="dfb708c9-d8dc-439f-9a3b-c772bf4a311c" providerId="ADAL" clId="{C2A075CF-C4D9-45BF-A2F4-9F4744A685AF}" dt="2023-09-06T11:09:34.920" v="3" actId="20577"/>
+        <pc:sldMkLst>
+          <pc:docMk/>
+          <pc:sldMk cId="1946753280" sldId="816"/>
+        </pc:sldMkLst>
+        <pc:spChg chg="mod">
+          <ac:chgData name="Matthieu De Mari" userId="dfb708c9-d8dc-439f-9a3b-c772bf4a311c" providerId="ADAL" clId="{C2A075CF-C4D9-45BF-A2F4-9F4744A685AF}" dt="2023-09-06T11:09:34.920" v="3" actId="20577"/>
+          <ac:spMkLst>
+            <pc:docMk/>
+            <pc:sldMk cId="1946753280" sldId="816"/>
+            <ac:spMk id="3" creationId="{63E638E1-0E19-7F02-7FE0-49EBCE47EBFA}"/>
+          </ac:spMkLst>
+        </pc:spChg>
+      </pc:sldChg>
+      <pc:sldChg chg="modSp mod">
+        <pc:chgData name="Matthieu De Mari" userId="dfb708c9-d8dc-439f-9a3b-c772bf4a311c" providerId="ADAL" clId="{C2A075CF-C4D9-45BF-A2F4-9F4744A685AF}" dt="2023-09-06T11:10:09.300" v="19" actId="20577"/>
+        <pc:sldMkLst>
+          <pc:docMk/>
+          <pc:sldMk cId="491711875" sldId="830"/>
+        </pc:sldMkLst>
+        <pc:spChg chg="mod">
+          <ac:chgData name="Matthieu De Mari" userId="dfb708c9-d8dc-439f-9a3b-c772bf4a311c" providerId="ADAL" clId="{C2A075CF-C4D9-45BF-A2F4-9F4744A685AF}" dt="2023-09-06T11:10:09.300" v="19" actId="20577"/>
+          <ac:spMkLst>
+            <pc:docMk/>
+            <pc:sldMk cId="491711875" sldId="830"/>
+            <ac:spMk id="3" creationId="{63E638E1-0E19-7F02-7FE0-49EBCE47EBFA}"/>
           </ac:spMkLst>
         </pc:spChg>
       </pc:sldChg>
@@ -7027,7 +7058,7 @@
           <a:p>
             <a:fld id="{61478373-EB31-4867-8CF0-FA31364748A5}" type="datetimeFigureOut">
               <a:rPr lang="en-GB" smtClean="0"/>
-              <a:t>06/07/2023</a:t>
+              <a:t>06/09/2023</a:t>
             </a:fld>
             <a:endParaRPr lang="en-GB"/>
           </a:p>
@@ -7444,7 +7475,7 @@
           <a:p>
             <a:fld id="{E85DF616-B21E-4EF6-A6A5-95E2FB3EB1A1}" type="datetimeFigureOut">
               <a:rPr lang="en-GB" smtClean="0"/>
-              <a:t>06/07/2023</a:t>
+              <a:t>06/09/2023</a:t>
             </a:fld>
             <a:endParaRPr lang="en-GB"/>
           </a:p>
@@ -7644,7 +7675,7 @@
           <a:p>
             <a:fld id="{E85DF616-B21E-4EF6-A6A5-95E2FB3EB1A1}" type="datetimeFigureOut">
               <a:rPr lang="en-GB" smtClean="0"/>
-              <a:t>06/07/2023</a:t>
+              <a:t>06/09/2023</a:t>
             </a:fld>
             <a:endParaRPr lang="en-GB"/>
           </a:p>
@@ -7854,7 +7885,7 @@
           <a:p>
             <a:fld id="{E85DF616-B21E-4EF6-A6A5-95E2FB3EB1A1}" type="datetimeFigureOut">
               <a:rPr lang="en-GB" smtClean="0"/>
-              <a:t>06/07/2023</a:t>
+              <a:t>06/09/2023</a:t>
             </a:fld>
             <a:endParaRPr lang="en-GB"/>
           </a:p>
@@ -8054,7 +8085,7 @@
           <a:p>
             <a:fld id="{E85DF616-B21E-4EF6-A6A5-95E2FB3EB1A1}" type="datetimeFigureOut">
               <a:rPr lang="en-GB" smtClean="0"/>
-              <a:t>06/07/2023</a:t>
+              <a:t>06/09/2023</a:t>
             </a:fld>
             <a:endParaRPr lang="en-GB"/>
           </a:p>
@@ -8330,7 +8361,7 @@
           <a:p>
             <a:fld id="{E85DF616-B21E-4EF6-A6A5-95E2FB3EB1A1}" type="datetimeFigureOut">
               <a:rPr lang="en-GB" smtClean="0"/>
-              <a:t>06/07/2023</a:t>
+              <a:t>06/09/2023</a:t>
             </a:fld>
             <a:endParaRPr lang="en-GB"/>
           </a:p>
@@ -8598,7 +8629,7 @@
           <a:p>
             <a:fld id="{E85DF616-B21E-4EF6-A6A5-95E2FB3EB1A1}" type="datetimeFigureOut">
               <a:rPr lang="en-GB" smtClean="0"/>
-              <a:t>06/07/2023</a:t>
+              <a:t>06/09/2023</a:t>
             </a:fld>
             <a:endParaRPr lang="en-GB"/>
           </a:p>
@@ -9013,7 +9044,7 @@
           <a:p>
             <a:fld id="{E85DF616-B21E-4EF6-A6A5-95E2FB3EB1A1}" type="datetimeFigureOut">
               <a:rPr lang="en-GB" smtClean="0"/>
-              <a:t>06/07/2023</a:t>
+              <a:t>06/09/2023</a:t>
             </a:fld>
             <a:endParaRPr lang="en-GB"/>
           </a:p>
@@ -9155,7 +9186,7 @@
           <a:p>
             <a:fld id="{E85DF616-B21E-4EF6-A6A5-95E2FB3EB1A1}" type="datetimeFigureOut">
               <a:rPr lang="en-GB" smtClean="0"/>
-              <a:t>06/07/2023</a:t>
+              <a:t>06/09/2023</a:t>
             </a:fld>
             <a:endParaRPr lang="en-GB"/>
           </a:p>
@@ -9268,7 +9299,7 @@
           <a:p>
             <a:fld id="{E85DF616-B21E-4EF6-A6A5-95E2FB3EB1A1}" type="datetimeFigureOut">
               <a:rPr lang="en-GB" smtClean="0"/>
-              <a:t>06/07/2023</a:t>
+              <a:t>06/09/2023</a:t>
             </a:fld>
             <a:endParaRPr lang="en-GB"/>
           </a:p>
@@ -9581,7 +9612,7 @@
           <a:p>
             <a:fld id="{E85DF616-B21E-4EF6-A6A5-95E2FB3EB1A1}" type="datetimeFigureOut">
               <a:rPr lang="en-GB" smtClean="0"/>
-              <a:t>06/07/2023</a:t>
+              <a:t>06/09/2023</a:t>
             </a:fld>
             <a:endParaRPr lang="en-GB"/>
           </a:p>
@@ -9870,7 +9901,7 @@
           <a:p>
             <a:fld id="{E85DF616-B21E-4EF6-A6A5-95E2FB3EB1A1}" type="datetimeFigureOut">
               <a:rPr lang="en-GB" smtClean="0"/>
-              <a:t>06/07/2023</a:t>
+              <a:t>06/09/2023</a:t>
             </a:fld>
             <a:endParaRPr lang="en-GB"/>
           </a:p>
@@ -10113,7 +10144,7 @@
           <a:p>
             <a:fld id="{E85DF616-B21E-4EF6-A6A5-95E2FB3EB1A1}" type="datetimeFigureOut">
               <a:rPr lang="en-GB" smtClean="0"/>
-              <a:t>06/07/2023</a:t>
+              <a:t>06/09/2023</a:t>
             </a:fld>
             <a:endParaRPr lang="en-GB"/>
           </a:p>
@@ -14826,8 +14857,8 @@
           </a:p>
         </p:txBody>
       </p:sp>
-      <mc:AlternateContent xmlns:mc="http://schemas.openxmlformats.org/markup-compatibility/2006">
-        <mc:Choice xmlns:a14="http://schemas.microsoft.com/office/drawing/2010/main" Requires="a14">
+      <mc:AlternateContent xmlns:mc="http://schemas.openxmlformats.org/markup-compatibility/2006" xmlns:a14="http://schemas.microsoft.com/office/drawing/2010/main">
+        <mc:Choice Requires="a14">
           <p:sp>
             <p:nvSpPr>
               <p:cNvPr id="3" name="Content Placeholder 2">
@@ -15029,7 +15060,7 @@
             </p:txBody>
           </p:sp>
         </mc:Choice>
-        <mc:Fallback>
+        <mc:Fallback xmlns="">
           <p:sp>
             <p:nvSpPr>
               <p:cNvPr id="3" name="Content Placeholder 2">
@@ -15128,8 +15159,8 @@
           </a:p>
         </p:txBody>
       </p:sp>
-      <mc:AlternateContent xmlns:mc="http://schemas.openxmlformats.org/markup-compatibility/2006">
-        <mc:Choice xmlns:a14="http://schemas.microsoft.com/office/drawing/2010/main" Requires="a14">
+      <mc:AlternateContent xmlns:mc="http://schemas.openxmlformats.org/markup-compatibility/2006" xmlns:a14="http://schemas.microsoft.com/office/drawing/2010/main">
+        <mc:Choice Requires="a14">
           <p:sp>
             <p:nvSpPr>
               <p:cNvPr id="3" name="Content Placeholder 2">
@@ -15570,7 +15601,7 @@
             </p:txBody>
           </p:sp>
         </mc:Choice>
-        <mc:Fallback>
+        <mc:Fallback xmlns="">
           <p:sp>
             <p:nvSpPr>
               <p:cNvPr id="3" name="Content Placeholder 2">
@@ -15673,8 +15704,8 @@
           </a:p>
         </p:txBody>
       </p:sp>
-      <mc:AlternateContent xmlns:mc="http://schemas.openxmlformats.org/markup-compatibility/2006">
-        <mc:Choice xmlns:a14="http://schemas.microsoft.com/office/drawing/2010/main" Requires="a14">
+      <mc:AlternateContent xmlns:mc="http://schemas.openxmlformats.org/markup-compatibility/2006" xmlns:a14="http://schemas.microsoft.com/office/drawing/2010/main">
+        <mc:Choice Requires="a14">
           <p:sp>
             <p:nvSpPr>
               <p:cNvPr id="3" name="Content Placeholder 2">
@@ -15950,7 +15981,7 @@
             </p:txBody>
           </p:sp>
         </mc:Choice>
-        <mc:Fallback>
+        <mc:Fallback xmlns="">
           <p:sp>
             <p:nvSpPr>
               <p:cNvPr id="3" name="Content Placeholder 2">
@@ -15994,8 +16025,8 @@
           </p:sp>
         </mc:Fallback>
       </mc:AlternateContent>
-      <mc:AlternateContent xmlns:mc="http://schemas.openxmlformats.org/markup-compatibility/2006">
-        <mc:Choice xmlns:a14="http://schemas.microsoft.com/office/drawing/2010/main" Requires="a14">
+      <mc:AlternateContent xmlns:mc="http://schemas.openxmlformats.org/markup-compatibility/2006" xmlns:a14="http://schemas.microsoft.com/office/drawing/2010/main">
+        <mc:Choice Requires="a14">
           <p:sp>
             <p:nvSpPr>
               <p:cNvPr id="4" name="Content Placeholder 3">
@@ -16181,7 +16212,7 @@
             </p:txBody>
           </p:sp>
         </mc:Choice>
-        <mc:Fallback>
+        <mc:Fallback xmlns="">
           <p:sp>
             <p:nvSpPr>
               <p:cNvPr id="4" name="Content Placeholder 3">
@@ -16288,8 +16319,8 @@
           </a:p>
         </p:txBody>
       </p:sp>
-      <mc:AlternateContent xmlns:mc="http://schemas.openxmlformats.org/markup-compatibility/2006">
-        <mc:Choice xmlns:a14="http://schemas.microsoft.com/office/drawing/2010/main" Requires="a14">
+      <mc:AlternateContent xmlns:mc="http://schemas.openxmlformats.org/markup-compatibility/2006" xmlns:a14="http://schemas.microsoft.com/office/drawing/2010/main">
+        <mc:Choice Requires="a14">
           <p:sp>
             <p:nvSpPr>
               <p:cNvPr id="3" name="Content Placeholder 2">
@@ -16819,7 +16850,7 @@
             </p:txBody>
           </p:sp>
         </mc:Choice>
-        <mc:Fallback>
+        <mc:Fallback xmlns="">
           <p:sp>
             <p:nvSpPr>
               <p:cNvPr id="3" name="Content Placeholder 2">
@@ -16863,8 +16894,8 @@
           </p:sp>
         </mc:Fallback>
       </mc:AlternateContent>
-      <mc:AlternateContent xmlns:mc="http://schemas.openxmlformats.org/markup-compatibility/2006">
-        <mc:Choice xmlns:a14="http://schemas.microsoft.com/office/drawing/2010/main" Requires="a14">
+      <mc:AlternateContent xmlns:mc="http://schemas.openxmlformats.org/markup-compatibility/2006" xmlns:a14="http://schemas.microsoft.com/office/drawing/2010/main">
+        <mc:Choice Requires="a14">
           <p:sp>
             <p:nvSpPr>
               <p:cNvPr id="5" name="Content Placeholder 4">
@@ -17664,7 +17695,7 @@
             </p:txBody>
           </p:sp>
         </mc:Choice>
-        <mc:Fallback>
+        <mc:Fallback xmlns="">
           <p:sp>
             <p:nvSpPr>
               <p:cNvPr id="5" name="Content Placeholder 4">
@@ -18364,8 +18395,8 @@
           </a:p>
         </p:txBody>
       </p:sp>
-      <mc:AlternateContent xmlns:mc="http://schemas.openxmlformats.org/markup-compatibility/2006">
-        <mc:Choice xmlns:a14="http://schemas.microsoft.com/office/drawing/2010/main" Requires="a14">
+      <mc:AlternateContent xmlns:mc="http://schemas.openxmlformats.org/markup-compatibility/2006" xmlns:a14="http://schemas.microsoft.com/office/drawing/2010/main">
+        <mc:Choice Requires="a14">
           <p:sp>
             <p:nvSpPr>
               <p:cNvPr id="3" name="Content Placeholder 2">
@@ -18822,7 +18853,7 @@
             </p:txBody>
           </p:sp>
         </mc:Choice>
-        <mc:Fallback>
+        <mc:Fallback xmlns="">
           <p:sp>
             <p:nvSpPr>
               <p:cNvPr id="3" name="Content Placeholder 2">
@@ -18929,8 +18960,8 @@
           </a:p>
         </p:txBody>
       </p:sp>
-      <mc:AlternateContent xmlns:mc="http://schemas.openxmlformats.org/markup-compatibility/2006">
-        <mc:Choice xmlns:a14="http://schemas.microsoft.com/office/drawing/2010/main" Requires="a14">
+      <mc:AlternateContent xmlns:mc="http://schemas.openxmlformats.org/markup-compatibility/2006" xmlns:a14="http://schemas.microsoft.com/office/drawing/2010/main">
+        <mc:Choice Requires="a14">
           <p:sp>
             <p:nvSpPr>
               <p:cNvPr id="3" name="Content Placeholder 2">
@@ -19056,7 +19087,7 @@
             </p:txBody>
           </p:sp>
         </mc:Choice>
-        <mc:Fallback>
+        <mc:Fallback xmlns="">
           <p:sp>
             <p:nvSpPr>
               <p:cNvPr id="3" name="Content Placeholder 2">
@@ -19825,8 +19856,8 @@
           </a:p>
         </p:txBody>
       </p:sp>
-      <mc:AlternateContent xmlns:mc="http://schemas.openxmlformats.org/markup-compatibility/2006">
-        <mc:Choice xmlns:a14="http://schemas.microsoft.com/office/drawing/2010/main" Requires="a14">
+      <mc:AlternateContent xmlns:mc="http://schemas.openxmlformats.org/markup-compatibility/2006" xmlns:a14="http://schemas.microsoft.com/office/drawing/2010/main">
+        <mc:Choice Requires="a14">
           <p:sp>
             <p:nvSpPr>
               <p:cNvPr id="5" name="Content Placeholder 4">
@@ -20292,7 +20323,7 @@
             </p:txBody>
           </p:sp>
         </mc:Choice>
-        <mc:Fallback>
+        <mc:Fallback xmlns="">
           <p:sp>
             <p:nvSpPr>
               <p:cNvPr id="5" name="Content Placeholder 4">
@@ -20395,8 +20426,8 @@
           </a:p>
         </p:txBody>
       </p:sp>
-      <mc:AlternateContent xmlns:mc="http://schemas.openxmlformats.org/markup-compatibility/2006">
-        <mc:Choice xmlns:a14="http://schemas.microsoft.com/office/drawing/2010/main" Requires="a14">
+      <mc:AlternateContent xmlns:mc="http://schemas.openxmlformats.org/markup-compatibility/2006" xmlns:a14="http://schemas.microsoft.com/office/drawing/2010/main">
+        <mc:Choice Requires="a14">
           <p:sp>
             <p:nvSpPr>
               <p:cNvPr id="3" name="Content Placeholder 2">
@@ -20978,7 +21009,7 @@
             </p:txBody>
           </p:sp>
         </mc:Choice>
-        <mc:Fallback>
+        <mc:Fallback xmlns="">
           <p:sp>
             <p:nvSpPr>
               <p:cNvPr id="3" name="Content Placeholder 2">
@@ -21081,8 +21112,8 @@
           </a:p>
         </p:txBody>
       </p:sp>
-      <mc:AlternateContent xmlns:mc="http://schemas.openxmlformats.org/markup-compatibility/2006">
-        <mc:Choice xmlns:a14="http://schemas.microsoft.com/office/drawing/2010/main" Requires="a14">
+      <mc:AlternateContent xmlns:mc="http://schemas.openxmlformats.org/markup-compatibility/2006" xmlns:a14="http://schemas.microsoft.com/office/drawing/2010/main">
+        <mc:Choice Requires="a14">
           <p:sp>
             <p:nvSpPr>
               <p:cNvPr id="3" name="Content Placeholder 2">
@@ -21924,7 +21955,7 @@
             </p:txBody>
           </p:sp>
         </mc:Choice>
-        <mc:Fallback>
+        <mc:Fallback xmlns="">
           <p:sp>
             <p:nvSpPr>
               <p:cNvPr id="3" name="Content Placeholder 2">
@@ -23566,7 +23597,7 @@
             </a:pPr>
             <a:r>
               <a:rPr lang="en-GB" b="1" dirty="0"/>
-              <a:t>Good practice (another one): create </a:t>
+              <a:t>Good practice: create </a:t>
             </a:r>
             <a:r>
               <a:rPr lang="en-GB" b="1" dirty="0">
@@ -24238,23 +24269,31 @@
             </a:r>
             <a:r>
               <a:rPr lang="en-GB" dirty="0"/>
-              <a:t>This modular approach,</a:t>
+              <a:t>This modular approach, which</a:t>
             </a:r>
           </a:p>
           <a:p>
             <a:r>
               <a:rPr lang="en-GB" b="1" dirty="0"/>
-              <a:t>Defining blocks of layers,</a:t>
-            </a:r>
-          </a:p>
-          <a:p>
-            <a:r>
-              <a:rPr lang="en-GB" dirty="0"/>
-              <a:t>And eventually </a:t>
+              <a:t>Defines blocks of layers,</a:t>
+            </a:r>
+          </a:p>
+          <a:p>
+            <a:r>
+              <a:rPr lang="en-GB" dirty="0"/>
+              <a:t>And </a:t>
+            </a:r>
+            <a:r>
+              <a:rPr lang="en-GB"/>
+              <a:t>eventually </a:t>
+            </a:r>
+            <a:r>
+              <a:rPr lang="en-GB" b="1"/>
+              <a:t>assembles </a:t>
             </a:r>
             <a:r>
               <a:rPr lang="en-GB" b="1" dirty="0"/>
-              <a:t>assembling them in a larger Deep Neural Network </a:t>
+              <a:t>them in a larger Deep Neural Network </a:t>
             </a:r>
             <a:r>
               <a:rPr lang="en-GB" b="1" dirty="0" err="1"/>

</xml_diff>